<commit_message>
update to Rock emerges ppt
</commit_message>
<xml_diff>
--- a/ASMU432/ppts/RockEmerges.pptx
+++ b/ASMU432/ppts/RockEmerges.pptx
@@ -135,10 +135,6 @@
 </p:presentation>
 </file>
 
-<file path=ppt/revisionInfo.xml><?xml version="1.0" encoding="utf-8"?>
-<p1510:revInfo xmlns:a="http://schemas.openxmlformats.org/drawingml/2006/main" xmlns:r="http://schemas.openxmlformats.org/officeDocument/2006/relationships" xmlns:p1510="http://schemas.microsoft.com/office/powerpoint/2015/10/main"/>
-</file>
-
 <file path=ppt/notesMasters/notesMaster1.xml><?xml version="1.0" encoding="utf-8"?>
 <p:notesMaster xmlns:a="http://schemas.openxmlformats.org/drawingml/2006/main" xmlns:r="http://schemas.openxmlformats.org/officeDocument/2006/relationships" xmlns:p="http://schemas.openxmlformats.org/presentationml/2006/main">
   <p:cSld>
@@ -221,7 +217,7 @@
           <a:p>
             <a:fld id="{C291D997-D7C6-495A-ADFE-01BE34D636D4}" type="datetimeFigureOut">
               <a:rPr lang="en-US" smtClean="0"/>
-              <a:t>1/23/2018</a:t>
+              <a:t>10/1/2018</a:t>
             </a:fld>
             <a:endParaRPr lang="en-US"/>
           </a:p>
@@ -1042,7 +1038,7 @@
           <a:p>
             <a:fld id="{FBF630C0-B0E4-4EC2-AB0C-BE44B3506280}" type="datetimeFigureOut">
               <a:rPr lang="en-US" smtClean="0"/>
-              <a:t>1/23/2018</a:t>
+              <a:t>10/1/2018</a:t>
             </a:fld>
             <a:endParaRPr lang="en-US"/>
           </a:p>
@@ -1210,7 +1206,7 @@
           <a:p>
             <a:fld id="{FBF630C0-B0E4-4EC2-AB0C-BE44B3506280}" type="datetimeFigureOut">
               <a:rPr lang="en-US" smtClean="0"/>
-              <a:t>1/23/2018</a:t>
+              <a:t>10/1/2018</a:t>
             </a:fld>
             <a:endParaRPr lang="en-US"/>
           </a:p>
@@ -1388,7 +1384,7 @@
           <a:p>
             <a:fld id="{FBF630C0-B0E4-4EC2-AB0C-BE44B3506280}" type="datetimeFigureOut">
               <a:rPr lang="en-US" smtClean="0"/>
-              <a:t>1/23/2018</a:t>
+              <a:t>10/1/2018</a:t>
             </a:fld>
             <a:endParaRPr lang="en-US"/>
           </a:p>
@@ -1556,7 +1552,7 @@
           <a:p>
             <a:fld id="{FBF630C0-B0E4-4EC2-AB0C-BE44B3506280}" type="datetimeFigureOut">
               <a:rPr lang="en-US" smtClean="0"/>
-              <a:t>1/23/2018</a:t>
+              <a:t>10/1/2018</a:t>
             </a:fld>
             <a:endParaRPr lang="en-US"/>
           </a:p>
@@ -1801,7 +1797,7 @@
           <a:p>
             <a:fld id="{FBF630C0-B0E4-4EC2-AB0C-BE44B3506280}" type="datetimeFigureOut">
               <a:rPr lang="en-US" smtClean="0"/>
-              <a:t>1/23/2018</a:t>
+              <a:t>10/1/2018</a:t>
             </a:fld>
             <a:endParaRPr lang="en-US"/>
           </a:p>
@@ -2030,7 +2026,7 @@
           <a:p>
             <a:fld id="{FBF630C0-B0E4-4EC2-AB0C-BE44B3506280}" type="datetimeFigureOut">
               <a:rPr lang="en-US" smtClean="0"/>
-              <a:t>1/23/2018</a:t>
+              <a:t>10/1/2018</a:t>
             </a:fld>
             <a:endParaRPr lang="en-US"/>
           </a:p>
@@ -2394,7 +2390,7 @@
           <a:p>
             <a:fld id="{FBF630C0-B0E4-4EC2-AB0C-BE44B3506280}" type="datetimeFigureOut">
               <a:rPr lang="en-US" smtClean="0"/>
-              <a:t>1/23/2018</a:t>
+              <a:t>10/1/2018</a:t>
             </a:fld>
             <a:endParaRPr lang="en-US"/>
           </a:p>
@@ -2511,7 +2507,7 @@
           <a:p>
             <a:fld id="{FBF630C0-B0E4-4EC2-AB0C-BE44B3506280}" type="datetimeFigureOut">
               <a:rPr lang="en-US" smtClean="0"/>
-              <a:t>1/23/2018</a:t>
+              <a:t>10/1/2018</a:t>
             </a:fld>
             <a:endParaRPr lang="en-US"/>
           </a:p>
@@ -2606,7 +2602,7 @@
           <a:p>
             <a:fld id="{FBF630C0-B0E4-4EC2-AB0C-BE44B3506280}" type="datetimeFigureOut">
               <a:rPr lang="en-US" smtClean="0"/>
-              <a:t>1/23/2018</a:t>
+              <a:t>10/1/2018</a:t>
             </a:fld>
             <a:endParaRPr lang="en-US"/>
           </a:p>
@@ -2881,7 +2877,7 @@
           <a:p>
             <a:fld id="{FBF630C0-B0E4-4EC2-AB0C-BE44B3506280}" type="datetimeFigureOut">
               <a:rPr lang="en-US" smtClean="0"/>
-              <a:t>1/23/2018</a:t>
+              <a:t>10/1/2018</a:t>
             </a:fld>
             <a:endParaRPr lang="en-US"/>
           </a:p>
@@ -3133,7 +3129,7 @@
           <a:p>
             <a:fld id="{FBF630C0-B0E4-4EC2-AB0C-BE44B3506280}" type="datetimeFigureOut">
               <a:rPr lang="en-US" smtClean="0"/>
-              <a:t>1/23/2018</a:t>
+              <a:t>10/1/2018</a:t>
             </a:fld>
             <a:endParaRPr lang="en-US"/>
           </a:p>
@@ -3354,7 +3350,7 @@
           <a:p>
             <a:fld id="{FBF630C0-B0E4-4EC2-AB0C-BE44B3506280}" type="datetimeFigureOut">
               <a:rPr lang="en-US" smtClean="0"/>
-              <a:t>1/23/2018</a:t>
+              <a:t>10/1/2018</a:t>
             </a:fld>
             <a:endParaRPr lang="en-US"/>
           </a:p>
@@ -3995,8 +3991,21 @@
                   <a:srgbClr val="FF0000"/>
                 </a:solidFill>
               </a:rPr>
-              <a:t>Spread of leisure, the near necessity to enjoy life</a:t>
-            </a:r>
+              <a:t>Spread of leisure, the near necessity to </a:t>
+            </a:r>
+            <a:r>
+              <a:rPr lang="en-US" sz="3200" b="1">
+                <a:solidFill>
+                  <a:srgbClr val="FF0000"/>
+                </a:solidFill>
+              </a:rPr>
+              <a:t>enjoy life</a:t>
+            </a:r>
+            <a:endParaRPr lang="en-US" sz="3200" b="1" dirty="0">
+              <a:solidFill>
+                <a:srgbClr val="FF0000"/>
+              </a:solidFill>
+            </a:endParaRPr>
           </a:p>
           <a:p>
             <a:r>
@@ -7008,7 +7017,7 @@
           <a:p>
             <a:r>
               <a:rPr lang="en-US" dirty="0"/>
-              <a:t>17 May 17 1954, Chief Justice Earl Warren Court unanimously (9–0) decided that "separate educational facilities are inherently unequal.“</a:t>
+              <a:t>17 May 17 1954, Chief Justice Earl Warren Court unanimously (9–0) decided that “separate educational facilities are inherently unequal.”</a:t>
             </a:r>
           </a:p>
           <a:p>

</xml_diff>